<commit_message>
Correção (ajuste do logo)
</commit_message>
<xml_diff>
--- a/PastaDocumentos/Pitch.pptx
+++ b/PastaDocumentos/Pitch.pptx
@@ -104,37 +104,15 @@
       </a:defRPr>
     </a:lvl9pPr>
   </p:defaultTextStyle>
+  <p:extLst>
+    <p:ext uri="{EFAFB233-063F-42B5-8137-9DF3F51BA10A}">
+      <p15:sldGuideLst xmlns:p15="http://schemas.microsoft.com/office/powerpoint/2012/main"/>
+    </p:ext>
+  </p:extLst>
 </p:presentation>
 </file>
 
 <file path=ppt/ink/ink1.xml><?xml version="1.0" encoding="utf-8"?>
-<inkml:ink xmlns:inkml="http://www.w3.org/2003/InkML">
-  <inkml:definitions>
-    <inkml:context xml:id="ctx0">
-      <inkml:inkSource xml:id="inkSrc0">
-        <inkml:traceFormat>
-          <inkml:channel name="X" type="integer" min="-2.14748E9" max="2.14748E9" units="cm"/>
-          <inkml:channel name="Y" type="integer" min="-2.14748E9" max="2.14748E9" units="cm"/>
-        </inkml:traceFormat>
-        <inkml:channelProperties>
-          <inkml:channelProperty channel="X" name="resolution" value="1000" units="1/cm"/>
-          <inkml:channelProperty channel="Y" name="resolution" value="1000" units="1/cm"/>
-        </inkml:channelProperties>
-      </inkml:inkSource>
-      <inkml:timestamp xml:id="ts0" timeString="2024-03-21T12:31:11.474"/>
-    </inkml:context>
-    <inkml:brush xml:id="br0">
-      <inkml:brushProperty name="width" value="0.05" units="cm"/>
-      <inkml:brushProperty name="height" value="0.05" units="cm"/>
-      <inkml:brushProperty name="color" value="#E71224"/>
-      <inkml:brushProperty name="ignorePressure" value="1"/>
-    </inkml:brush>
-  </inkml:definitions>
-  <inkml:trace contextRef="#ctx0" brushRef="#br0">8122 2425,'46'37,"2"-1,1-3,2-2,1-2,1-2,2-3,0-2,2-3,0-2,95 15,-115-26,56-1,-91-4,0-1,1 0,-1 0,1 0,-1 0,0-1,1 1,-1 0,0-1,0 0,1 0,-1 1,0-1,0-1,0 1,0 0,0 0,0-1,0 1,-1-1,1 0,0 1,-1-1,1 0,-1 0,0 0,0 0,1 0,-1 0,-1 0,1 0,0-1,0 1,0-4,-1-3,0 0,0 0,-1-1,0 1,-1 0,0 0,0 0,-5-10,-15-32,-2 1,-2 1,-2 1,-3 2,-44-53,-32-34,-6 5,-5 5,-6 5,-5 6,-5 5,-231-140,211 158,-3 8,-4 6,-3 7,-3 8,-2 7,-226-41,104 55,258 37,1 2,0 2,-1 0,1 2,0 2,-58 18,75-18,1 0,0 1,0 1,0 0,1 1,0 1,1 0,0 0,1 2,0-1,1 1,0 1,0-1,-8 19,-4 11,1 0,3 2,-20 69,3 24,5 2,6 1,7 0,1 206,15-300,3 0,2 0,12 61,-11-86,1-1,0 0,2 0,0-1,1 0,1 0,1-1,0 0,23 26,-8-18,0-1,2-1,0-2,2-1,44 25,171 73,-244-118,370 143,-290-119,2-3,144 18,-217-39,10 2,0-1,0-2,1 0,26-3,-42 2,0 0,0 0,-1 0,1-1,0 1,0-1,-1-1,1 1,-1-1,1 1,-1-1,0 0,0-1,-1 1,1-1,-1 0,0 0,1 0,-2 0,1 0,0-1,2-6,2-8,-1 0,-1 0,-1 0,0-1,-1 1,-2-1,0 0,-1 1,0-1,-2 0,-1 0,-6-25,7 35,-1-1,0 1,-1 0,0 1,-1-1,0 1,0-1,-1 2,0-1,-1 0,1 1,-2 1,1-1,-1 1,0 0,-1 1,0 0,0 0,0 1,0 0,-1 1,0 0,0 0,-16-3,-13 1,0 2,0 1,0 2,0 2,-48 7,79-7,0 1,0 1,0-1,0 1,1 1,-1-1,1 1,0 1,0-1,0 1,1 0,-1 1,1-1,1 1,-1 1,1-1,0 1,0 0,1 0,-5 11,-1 2,2 2,0-1,1 1,2 0,0 1,-2 28,4-12,2 0,1-1,3 1,1-1,1 1,2-2,2 1,2-1,1 0,2-1,1-1,2 0,1-1,2-1,2 0,0-2,2-1,1-1,2-1,1-1,1-1,1-2,1-1,1-1,53 27,-44-30,0-2,1-1,1-2,0-3,1-1,0-2,0-2,1-2,0-2,58-4,-96 1,-1 0,0 0,0-1,0 0,0 0,0-1,0 0,0 1,-1-2,1 1,-1-1,0 0,0 0,7-8,-5 4,0-1,-1 0,0-1,0 1,-1-1,0-1,5-18,-2 2,-2-1,-1 1,-1-1,-2 0,-1-50,-3 49,-1 0,-1 0,-1 1,-2-1,0 1,-2 1,-2-1,0 2,-2-1,-24-38,24 47,-1-1,-1 2,0 0,-2 1,1 0,-2 1,0 1,-1 1,0 1,-1 0,0 2,-1 0,-42-13,28 13,-1 2,-58-6,75 12,0 1,0 1,0 1,0 1,0 0,-31 8,46-8,0-1,0 1,0 0,0 0,0 0,0 1,0 0,1-1,-1 1,1 0,0 0,0 1,0-1,0 1,1 0,-1-1,1 1,0 0,0 0,0 0,-1 8,0 2,0 0,1 0,1 0,0 0,2 25,4 6,2 1,2-2,1 1,3-1,2-1,1-1,30 57,-4-22,4-2,2-2,60 67,-34-56,3-4,3-3,3-3,4-5,3-3,170 94,-149-103,1-5,3-6,2-4,1-5,228 38,-274-64,1-2,0-4,1-4,115-11,-159 6,-1-2,1-1,-1-1,-1-2,53-25,-63 25,-1 0,0-2,-1 0,0-1,-1 0,0-1,-1-1,-1 0,20-30,-17 20,-2 0,-1-2,-1 1,-1-2,-1 0,-2 0,7-39,-10 27,-1 0,-2-1,-1 1,-10-74,-2 46,-4 1,-2 0,-4 1,-2 1,-3 1,-35-61,32 73,-2 2,-54-66,-85-77,71 84,88 98,-25-33,34 42,1 0,-1 0,1 0,0 0,-1-1,1 1,0 0,1-1,-1 1,0-1,1 0,-1 1,1-1,0 1,0-1,0-4,2 5,0 0,-1 0,1 0,0 0,0 0,1 1,-1-1,0 1,0 0,1-1,-1 1,1 0,-1 0,1 1,-1-1,1 1,0-1,-1 1,1 0,5 0,7-3,211-65,-158 46,-328 125,83-28,-52 9,-4-11,-368 65,-508-5,407-102,82-38,-635-91,-581-218,1417 216,153 22,234 67,0-1,-43-24,71 34,1 1,0-1,0 0,0-1,0 1,0 0,1-1,-1 1,1-1,-1 0,1 0,0 0,-2-5,4 7,-1 0,1 0,0-1,0 1,0 0,0 0,0-1,0 1,0 0,0-1,0 1,1 0,-1 0,0-1,1 1,-1 0,1 0,0 0,-1 0,1 0,0 0,0 0,-1 0,3-2,4-3,1 1,0 0,1 0,-1 1,1 0,-1 0,17-4,130-34,261-36,-349 67,998-93,-1 77,1777 41,-2486 1,-348-14,107 4,160 30,-263-33,1 0,-1 2,21 8,-21-2,-15-2,-20 1,-79 8,82-8,20-9,1 0,0 0,-1 1,1-1,0 0,0 1,-1-1,1 0,0 1,0-1,-1 0,1 1,0-1,0 1,0-1,0 1,0-1,0 0,-1 1,1-1,0 1,0-1,0 1,0-1,1 0,-1 1,0 0,2 2,0 0,0 0,1 0,-1-1,1 1,0-1,-1 1,1-1,0 0,1 0,2 1,57 32,2-4,132 45,-192-75,886 261,18-65,-682-149,-211-45,-1 2,1-1,29 15,-45-19,1 0,-1 0,1 0,-1 1,1-1,-1 0,1 0,-1 1,0-1,1 0,-1 1,1-1,-1 1,0-1,1 1,-1-1,0 0,1 1,-1-1,0 1,0-1,1 1,-1-1,0 1,0 0,0-1,0 1,0-1,0 1,0-1,0 1,0-1,0 1,0-1,0 1,0 0,0-1,0 1,-1-1,1 1,0-1,-1 1,-2 2,-1-1,0 1,0-1,0 0,0 0,0-1,0 1,-1-1,1 0,-5 1,-61 11,-75 3,-246 9,-577 9,-673 42,1414-54,214-20,0-1,0 2,-24 7,37-10,1 0,-1 0,0 0,0 0,0 0,0 0,1 0,-1 0,0 0,0 0,0 0,0 0,1 0,-1 0,0 0,0 0,0 0,0 0,1 0,-1 0,0 0,0 0,0 0,0 0,1 0,-1 1,0-1,0 0,0 0,0 0,0 0,0 0,1 1,-1-1,0 0,0 0,0 0,0 0,0 1,0-1,0 0,0 0,0 0,0 0,0 1,0-1,0 0,0 0,0 0,0 0,0 1,0-1,0 0,0 0,0 0,0 1,0-1,-1 0,1 0,0 0,0 0,0 0,0 1,0-1,0 0,0 0,-1 0,1 0,41 7,113 2,1-5,0-8,-1-7,266-52,-276 27,-125 31,-1-2,1 0,-1-1,30-19,-46 26,0 0,-1 0,1 0,0 0,0 0,-1 0,1-1,-1 1,1 0,-1-1,0 0,1 1,-1-1,0 0,0 1,0-1,0 0,-1 0,1 0,0 0,-1 0,1 0,-1 0,0 0,0 0,1 0,-1 0,-1 0,1 0,0 0,0 0,-1 0,1 0,-1 0,-1-3,-3-3,-1 1,0 0,0 0,-1 0,0 1,0 0,0 0,-10-5,-45-28,-86-40,-230-87,-204-37,-434-83,-11 44,586 141,205 33,232 67,0-1,0 1,0-1,0 0,0 0,1-1,-1 1,-5-6,9 8,0-1,0 1,-1-1,1 1,0-1,0 1,0-1,0 1,0-1,0 1,0-1,0 1,0-1,0 1,1-1,-1 1,0-1,0 1,0-1,1 1,-1-1,0 1,0 0,1-1,-1 1,0-1,1 1,-1 0,1-1,-1 1,0 0,1-1,-1 1,1 0,-1 0,1 0,-1-1,1 1,-1 0,1 0,-1 0,1 0,-1 0,1 0,-1 0,1 0,0 0,34-7,1 2,-1 1,40 2,319-3,233 7,182-4,133-21,2771-282,-3126 228,-187 16,-319 48,-5 2,106-31,-329 77,-743 220,381-123,-203 72,-181 60,-2707 798,2991-888,167-54,168-50,151-44,109-28,29-7,42-10,2 3,110-16,107-4,98 6,122 3,110-6,1874-265,-2096 219,-154 18,-222 58,0 1,-1-1,1-1,-1 1,0-1,8-6,-15 10,1-1,-1 1,1 0,-1-1,1 1,-1 0,0-1,1 1,-1-1,0 1,1-1,-1 1,0-1,0 1,0-1,1 1,-1-1,0 1,0-1,0 1,0-1,0 1,0-1,0 1,0-1,0 1,0-1,0 1,0-1,0 0,-1 1,1-1,0 1,0-1,0 1,-1 0,1-1,0 1,-1-1,1 1,0-1,-1 1,1 0,-1-1,1 1,0 0,-2-1,-13-6,0 2,0-1,-1 2,0 0,-24-3,-286-40,-193-7,-1918-64,-4 150,2282-26,-182-2,320-8,37-4,349-86,50-36,732-338,-999 394,-94 42,-54 32,1 0,-1 0,0 0,0 0,1 0,-1 0,0 0,0 0,0 0,1 0,-1-1,0 1,0 0,0 0,1 0,-1 0,0 0,0 0,0 0,1-1,-1 1,0 0,0 0,0 0,0 0,0-1,0 1,1 0,-1 0,0 0,0-1,0 1,0 0,0 0,0 0,0-1,0 1,0 0,0 0,0-1,0 1,0 0,0 0,0 0,0-1,0 1,0 0,0 0,0-1,-1 1,-28 6,-99 35,1 6,-172 89,218-93,3 4,2 3,2 3,-108 102,146-119,2 2,1 1,2 1,2 2,1 1,-42 91,60-110,1 1,2 0,0 0,2 1,0-1,0 42,5-48,0 0,2 0,1-1,0 1,1 0,1-1,1 0,0 0,17 31,-11-29,0-1,2 0,0-1,1-1,1 0,0-1,1-1,1 0,1-2,0 0,0-1,27 12,1-3,0-2,1-3,1-2,82 14,-39-15,130 1,177-30,114-54,-88-17,-3-18,-5-19,473-209,-573 185,-114 33,-186 104,0 0,-1-1,-1-1,22-24,-35 36,0-1,-1 0,1 1,-1-1,0 0,0 0,1 0,-1 0,-1 0,1 0,0 0,0 0,-1-1,1 1,-1 0,0 0,1-1,-1 1,0 0,0 0,-1-1,0-3,0 3,-1 1,1 0,-1 0,1 0,-1 0,0 0,0 0,0 1,0-1,0 1,-1-1,1 1,0 0,-1 0,1 0,-4-1,-11-3,0 1,1 1,-2 0,-25 0,11 2,0 1,0 1,-1 2,1 1,1 2,-1 1,1 2,0 0,1 2,0 2,1 0,0 2,1 1,-30 24,22-8,1 2,1 1,3 1,0 2,3 2,-29 50,23-27,2 0,4 3,-33 108,52-144,2 0,1 0,2 0,0 1,2 54,3-71,1 1,0-1,1 1,0-1,1 0,1 0,0 0,1-1,0 0,1 0,1-1,0 1,0-1,11 10,-3-6,1-1,1-1,0-1,1 0,0-1,1-1,0-1,0-1,31 9,-7-5,2-1,-1-3,73 6,-87-12,1-2,0-1,-1-1,1-1,-1-2,1-1,-1-2,-1-1,1-1,-2-2,1-1,-1-1,-1-2,-1 0,31-23,-26 11,-1-1,-1-1,-2-1,-1-2,-1-1,-2-1,-2 0,-1-2,-1-1,-2 0,-2-2,-1 0,11-51,-15 42,-2 0,-2 0,-3 0,-1 0,-3-1,-2 0,-2 1,-2 0,-2 0,-2 1,-18-52,8 45,-2 2,-2 0,-3 2,-1 1,-3 1,-2 1,-2 2,-80-79,35 53,-3 3,-2 4,-4 4,-108-55,-23 2,-247-88,-478-110,249 133,-6 31,-1356-105,1118 245,723 21,-285 54,409-49,1 4,2 4,-128 55,184-66,1 1,0 1,2 2,0 1,1 1,1 2,-27 29,44-39,0 1,0 0,1 1,1 1,1 0,0 0,1 0,1 1,1 0,0 1,2-1,0 1,1 0,-2 34,6-23,2 1,0-1,2 0,1 0,2 0,0-1,2 0,2-1,23 44,3-7,2-2,3-1,3-3,88 90,-25-45,5-5,180 123,-82-86,314 151,410 100,-375-206,7-24,7-25,936 91,-569-175,-167-84,-580 13,200-52,-308 53,-1-3,149-66,-204 76,-1-2,0 0,-1-2,0-1,-2-1,28-29,-42 37,-1-1,-1-1,0 0,-1 0,0-1,-2-1,1 0,-2 0,-1 0,0-1,-1 0,4-26,-6 16,-1 0,-1 0,-2 0,-1 0,-1 1,-1-1,-2 1,-13-41,1 17,-2 2,-2 0,-53-83,26 60,-3 2,-3 2,-65-60,-1 13,-227-165,-369-173,-218-14,248 186,-763-202,515 247,199 113,620 110,1 6,-180 11,260-2,0 3,1 0,0 3,0 0,0 3,1 0,-49 25,65-25,0 0,1 0,0 2,0 0,1 1,1 0,1 1,0 1,1 0,0 1,2 0,0 1,-15 35,11-11,1 2,2-1,2 1,2 1,2 0,0 59,7 6,4-1,30 162,0-90,8-3,8-1,8-3,142 288,-130-326,6-3,6-4,6-4,4-3,6-5,136 123,-107-128,5-6,196 118,-127-107,362 152,-254-151,326 77,483 39,-252-117,4-37,1144-41,-973-113,-231-54,-631 85,217-80,-305 87,-2-4,100-60,-153 77,-2-1,0-2,-2-1,33-35,-54 49,-1 0,0-1,-1-1,-1 0,0 0,8-20,-15 29,0-1,-1 0,0 0,0 0,-1 1,0-2,0 1,-1 0,0 0,0 0,0 0,-1 0,0 0,0 0,-1 0,0 0,-4-8,0 3,-1 0,0 1,-1 0,0 0,-1 0,0 1,-1 0,0 1,-20-15,-16-6,-56-30,-38-12,-3 6,-225-70,167 78,-291-46,378 87,-1 6,0 4,0 5,-1 5,1 5,0 5,1 6,1 4,-199 68,214-52,1 4,2 5,2 3,3 5,-90 72,120-80,3 2,2 3,2 2,3 3,2 1,3 3,-65 117,93-149,2 2,1-1,2 1,1 1,1 0,2 1,1 0,2 0,-1 65,6-86,1-1,1 1,0-1,1 0,0 1,0-1,2-1,-1 1,2-1,-1 1,11 13,-10-17,0 0,1-1,0 0,1 0,-1-1,1 0,0-1,1 1,-1-1,1-1,0 0,0 0,1-1,13 4,0-3,0-1,1 0,-1-2,1-1,0-1,-1 0,1-2,-1-1,0-1,40-14,-19 3,-2-2,0-2,-1-2,63-43,-57 29,-2-2,-1-2,-2-2,-2-1,-2-3,-2 0,-1-3,49-95,-48 71,-3-2,-4-2,-3-1,-3 0,23-151,-41 194,-2 0,0 0,-3 0,-1-1,-1 1,-2 0,-2 0,-10-36,5 39,-2 0,-1 1,-2 1,0 0,-3 1,0 0,-1 2,-47-48,-20-10,-143-108,-255-145,31 61,-11 21,-12 20,-662-230,661 314,118 65,320 80,-1 0,1 3,-1 2,0 1,0 2,-43 7,64-5,0 2,0 1,0 1,1 0,0 1,0 1,1 1,0 1,1 0,0 1,1 1,0 1,-15 17,-6 11,1 2,3 2,2 1,-38 73,27-30,-53 156,94-244,-4 12,0 0,0 0,1 0,1 1,1 0,0-1,0 1,2 0,0 0,2 16,-1-28,0 0,0 1,0-1,1 0,0 0,-1 0,1 0,0 0,1 0,-1 0,0-1,1 1,-1-1,1 0,0 0,0 1,0-2,0 1,0 0,0-1,1 1,-1-1,0 0,1 0,5 0,5 1,0-1,0 0,0-1,28-4,2-2</inkml:trace>
-</inkml:ink>
-</file>
-
-<file path=ppt/ink/ink2.xml><?xml version="1.0" encoding="utf-8"?>
 <inkml:ink xmlns:inkml="http://www.w3.org/2003/InkML">
   <inkml:definitions>
     <inkml:context xml:id="ctx0">
@@ -161,7 +139,7 @@
 </inkml:ink>
 </file>
 
-<file path=ppt/ink/ink3.xml><?xml version="1.0" encoding="utf-8"?>
+<file path=ppt/ink/ink2.xml><?xml version="1.0" encoding="utf-8"?>
 <inkml:ink xmlns:inkml="http://www.w3.org/2003/InkML">
   <inkml:definitions>
     <inkml:context xml:id="ctx0">
@@ -3447,7 +3425,12 @@
             <p:ph type="subTitle" idx="1"/>
           </p:nvPr>
         </p:nvSpPr>
-        <p:spPr/>
+        <p:spPr>
+          <a:xfrm>
+            <a:off x="1524000" y="3587927"/>
+            <a:ext cx="9144000" cy="1655762"/>
+          </a:xfrm>
+        </p:spPr>
         <p:txBody>
           <a:bodyPr/>
           <a:lstStyle/>
@@ -3463,106 +3446,9 @@
           </a:p>
         </p:txBody>
       </p:sp>
-      <p:sp>
-        <p:nvSpPr>
-          <p:cNvPr id="4" name="Oval 3">
-            <a:extLst>
-              <a:ext uri="{FF2B5EF4-FFF2-40B4-BE49-F238E27FC236}">
-                <a16:creationId xmlns:a16="http://schemas.microsoft.com/office/drawing/2014/main" id="{69D8E232-2FCD-441D-BE34-58B15F817F8C}"/>
-              </a:ext>
-            </a:extLst>
-          </p:cNvPr>
-          <p:cNvSpPr/>
-          <p:nvPr/>
-        </p:nvSpPr>
-        <p:spPr>
-          <a:xfrm>
-            <a:off x="9313334" y="4267200"/>
-            <a:ext cx="2156178" cy="1986844"/>
-          </a:xfrm>
-          <a:prstGeom prst="ellipse">
-            <a:avLst/>
-          </a:prstGeom>
-        </p:spPr>
-        <p:style>
-          <a:lnRef idx="2">
-            <a:schemeClr val="accent1">
-              <a:shade val="50000"/>
-            </a:schemeClr>
-          </a:lnRef>
-          <a:fillRef idx="1">
-            <a:schemeClr val="accent1"/>
-          </a:fillRef>
-          <a:effectRef idx="0">
-            <a:schemeClr val="accent1"/>
-          </a:effectRef>
-          <a:fontRef idx="minor">
-            <a:schemeClr val="lt1"/>
-          </a:fontRef>
-        </p:style>
-        <p:txBody>
-          <a:bodyPr rtlCol="0" anchor="ctr"/>
-          <a:lstStyle/>
-          <a:p>
-            <a:pPr algn="ctr"/>
-            <a:endParaRPr lang="en-US"/>
-          </a:p>
-        </p:txBody>
-      </p:sp>
-      <mc:AlternateContent xmlns:mc="http://schemas.openxmlformats.org/markup-compatibility/2006">
-        <mc:Choice xmlns:p14="http://schemas.microsoft.com/office/powerpoint/2010/main" Requires="p14">
+      <mc:AlternateContent xmlns:mc="http://schemas.openxmlformats.org/markup-compatibility/2006" xmlns:p14="http://schemas.microsoft.com/office/powerpoint/2010/main">
+        <mc:Choice Requires="p14">
           <p:contentPart p14:bwMode="auto" r:id="rId2">
-            <p14:nvContentPartPr>
-              <p14:cNvPr id="5" name="Ink 4">
-                <a:extLst>
-                  <a:ext uri="{FF2B5EF4-FFF2-40B4-BE49-F238E27FC236}">
-                    <a16:creationId xmlns:a16="http://schemas.microsoft.com/office/drawing/2014/main" id="{9F303B60-967B-4DF1-81A8-1755D6D116BC}"/>
-                  </a:ext>
-                </a:extLst>
-              </p14:cNvPr>
-              <p14:cNvContentPartPr/>
-              <p14:nvPr/>
-            </p14:nvContentPartPr>
-            <p14:xfrm>
-              <a:off x="7563458" y="4229636"/>
-              <a:ext cx="4634640" cy="1822680"/>
-            </p14:xfrm>
-          </p:contentPart>
-        </mc:Choice>
-        <mc:Fallback>
-          <p:pic>
-            <p:nvPicPr>
-              <p:cNvPr id="5" name="Ink 4">
-                <a:extLst>
-                  <a:ext uri="{FF2B5EF4-FFF2-40B4-BE49-F238E27FC236}">
-                    <a16:creationId xmlns:a16="http://schemas.microsoft.com/office/drawing/2014/main" id="{9F303B60-967B-4DF1-81A8-1755D6D116BC}"/>
-                  </a:ext>
-                </a:extLst>
-              </p:cNvPr>
-              <p:cNvPicPr/>
-              <p:nvPr/>
-            </p:nvPicPr>
-            <p:blipFill>
-              <a:blip r:embed="rId3"/>
-              <a:stretch>
-                <a:fillRect/>
-              </a:stretch>
-            </p:blipFill>
-            <p:spPr>
-              <a:xfrm>
-                <a:off x="7554458" y="4220996"/>
-                <a:ext cx="4652280" cy="1840320"/>
-              </a:xfrm>
-              <a:prstGeom prst="rect">
-                <a:avLst/>
-              </a:prstGeom>
-            </p:spPr>
-          </p:pic>
-        </mc:Fallback>
-      </mc:AlternateContent>
-      <mc:AlternateContent xmlns:mc="http://schemas.openxmlformats.org/markup-compatibility/2006">
-        <mc:Choice xmlns:p14="http://schemas.microsoft.com/office/powerpoint/2010/main" Requires="p14">
-          <p:contentPart p14:bwMode="auto" r:id="rId4">
             <p14:nvContentPartPr>
               <p14:cNvPr id="6" name="Ink 5">
                 <a:extLst>
@@ -3580,7 +3466,7 @@
             </p14:xfrm>
           </p:contentPart>
         </mc:Choice>
-        <mc:Fallback>
+        <mc:Fallback xmlns="">
           <p:pic>
             <p:nvPicPr>
               <p:cNvPr id="6" name="Ink 5">
@@ -3611,8 +3497,8 @@
           </p:pic>
         </mc:Fallback>
       </mc:AlternateContent>
-      <mc:AlternateContent xmlns:mc="http://schemas.openxmlformats.org/markup-compatibility/2006">
-        <mc:Choice xmlns:p14="http://schemas.microsoft.com/office/powerpoint/2010/main" Requires="p14">
+      <mc:AlternateContent xmlns:mc="http://schemas.openxmlformats.org/markup-compatibility/2006" xmlns:p14="http://schemas.microsoft.com/office/powerpoint/2010/main">
+        <mc:Choice Requires="p14">
           <p:contentPart p14:bwMode="auto" r:id="rId6">
             <p14:nvContentPartPr>
               <p14:cNvPr id="7" name="Ink 6">
@@ -3631,7 +3517,7 @@
             </p14:xfrm>
           </p:contentPart>
         </mc:Choice>
-        <mc:Fallback>
+        <mc:Fallback xmlns="">
           <p:pic>
             <p:nvPicPr>
               <p:cNvPr id="7" name="Ink 6">
@@ -3662,6 +3548,55 @@
           </p:pic>
         </mc:Fallback>
       </mc:AlternateContent>
+      <p:sp>
+        <p:nvSpPr>
+          <p:cNvPr id="8" name="Rectangle 7">
+            <a:extLst>
+              <a:ext uri="{FF2B5EF4-FFF2-40B4-BE49-F238E27FC236}">
+                <a16:creationId xmlns:a16="http://schemas.microsoft.com/office/drawing/2014/main" id="{A1DC50B7-72A4-4989-BCF5-13062B6E6085}"/>
+              </a:ext>
+            </a:extLst>
+          </p:cNvPr>
+          <p:cNvSpPr/>
+          <p:nvPr/>
+        </p:nvSpPr>
+        <p:spPr>
+          <a:xfrm>
+            <a:off x="1083733" y="3602038"/>
+            <a:ext cx="3928534" cy="2787473"/>
+          </a:xfrm>
+          <a:prstGeom prst="rect">
+            <a:avLst/>
+          </a:prstGeom>
+        </p:spPr>
+        <p:style>
+          <a:lnRef idx="2">
+            <a:schemeClr val="accent2">
+              <a:shade val="50000"/>
+            </a:schemeClr>
+          </a:lnRef>
+          <a:fillRef idx="1">
+            <a:schemeClr val="accent2"/>
+          </a:fillRef>
+          <a:effectRef idx="0">
+            <a:schemeClr val="accent2"/>
+          </a:effectRef>
+          <a:fontRef idx="minor">
+            <a:schemeClr val="lt1"/>
+          </a:fontRef>
+        </p:style>
+        <p:txBody>
+          <a:bodyPr rtlCol="0" anchor="ctr"/>
+          <a:lstStyle/>
+          <a:p>
+            <a:pPr algn="ctr"/>
+            <a:r>
+              <a:rPr lang="pt-BR" dirty="0"/>
+              <a:t>LOGO</a:t>
+            </a:r>
+          </a:p>
+        </p:txBody>
+      </p:sp>
     </p:spTree>
     <p:extLst>
       <p:ext uri="{BB962C8B-B14F-4D97-AF65-F5344CB8AC3E}">

</xml_diff>